<commit_message>
Explaining the literature review
</commit_message>
<xml_diff>
--- a/Term3/PresentationMidPoint.pptx
+++ b/Term3/PresentationMidPoint.pptx
@@ -3669,6 +3669,458 @@
               <a:rPr lang="en-GB" sz="1400" dirty="0"/>
               <a:t> and design of computer systems: Queueing theory in action. Cambridge University Press. </a:t>
             </a:r>
+          </a:p>
+        </p:txBody>
+      </p:sp>
+      <p:sp>
+        <p:nvSpPr>
+          <p:cNvPr id="4" name="Content Placeholder 2">
+            <a:extLst>
+              <a:ext uri="{FF2B5EF4-FFF2-40B4-BE49-F238E27FC236}">
+                <a16:creationId xmlns:a16="http://schemas.microsoft.com/office/drawing/2014/main" id="{B325B3FC-5DD2-9540-CCB4-36433D3EF9FD}"/>
+              </a:ext>
+            </a:extLst>
+          </p:cNvPr>
+          <p:cNvSpPr txBox="1">
+            <a:spLocks/>
+          </p:cNvSpPr>
+          <p:nvPr/>
+        </p:nvSpPr>
+        <p:spPr>
+          <a:xfrm>
+            <a:off x="272145" y="1875388"/>
+            <a:ext cx="3282820" cy="4351338"/>
+          </a:xfrm>
+          <a:prstGeom prst="rect">
+            <a:avLst/>
+          </a:prstGeom>
+        </p:spPr>
+        <p:txBody>
+          <a:bodyPr vert="horz" lIns="91440" tIns="45720" rIns="91440" bIns="45720" rtlCol="0">
+            <a:normAutofit/>
+          </a:bodyPr>
+          <a:lstStyle>
+            <a:lvl1pPr marL="228600" indent="-228600" algn="l" defTabSz="914400" rtl="0" eaLnBrk="1" latinLnBrk="0" hangingPunct="1">
+              <a:lnSpc>
+                <a:spcPct val="90000"/>
+              </a:lnSpc>
+              <a:spcBef>
+                <a:spcPts val="1000"/>
+              </a:spcBef>
+              <a:buFont typeface="Arial" panose="020B0604020202020204" pitchFamily="34" charset="0"/>
+              <a:buChar char="•"/>
+              <a:defRPr sz="2800" kern="1200">
+                <a:solidFill>
+                  <a:schemeClr val="tx1"/>
+                </a:solidFill>
+                <a:latin typeface="+mn-lt"/>
+                <a:ea typeface="+mn-ea"/>
+                <a:cs typeface="+mn-cs"/>
+              </a:defRPr>
+            </a:lvl1pPr>
+            <a:lvl2pPr marL="685800" indent="-228600" algn="l" defTabSz="914400" rtl="0" eaLnBrk="1" latinLnBrk="0" hangingPunct="1">
+              <a:lnSpc>
+                <a:spcPct val="90000"/>
+              </a:lnSpc>
+              <a:spcBef>
+                <a:spcPts val="500"/>
+              </a:spcBef>
+              <a:buFont typeface="Arial" panose="020B0604020202020204" pitchFamily="34" charset="0"/>
+              <a:buChar char="•"/>
+              <a:defRPr sz="2400" kern="1200">
+                <a:solidFill>
+                  <a:schemeClr val="tx1"/>
+                </a:solidFill>
+                <a:latin typeface="+mn-lt"/>
+                <a:ea typeface="+mn-ea"/>
+                <a:cs typeface="+mn-cs"/>
+              </a:defRPr>
+            </a:lvl2pPr>
+            <a:lvl3pPr marL="1143000" indent="-228600" algn="l" defTabSz="914400" rtl="0" eaLnBrk="1" latinLnBrk="0" hangingPunct="1">
+              <a:lnSpc>
+                <a:spcPct val="90000"/>
+              </a:lnSpc>
+              <a:spcBef>
+                <a:spcPts val="500"/>
+              </a:spcBef>
+              <a:buFont typeface="Arial" panose="020B0604020202020204" pitchFamily="34" charset="0"/>
+              <a:buChar char="•"/>
+              <a:defRPr sz="2000" kern="1200">
+                <a:solidFill>
+                  <a:schemeClr val="tx1"/>
+                </a:solidFill>
+                <a:latin typeface="+mn-lt"/>
+                <a:ea typeface="+mn-ea"/>
+                <a:cs typeface="+mn-cs"/>
+              </a:defRPr>
+            </a:lvl3pPr>
+            <a:lvl4pPr marL="1600200" indent="-228600" algn="l" defTabSz="914400" rtl="0" eaLnBrk="1" latinLnBrk="0" hangingPunct="1">
+              <a:lnSpc>
+                <a:spcPct val="90000"/>
+              </a:lnSpc>
+              <a:spcBef>
+                <a:spcPts val="500"/>
+              </a:spcBef>
+              <a:buFont typeface="Arial" panose="020B0604020202020204" pitchFamily="34" charset="0"/>
+              <a:buChar char="•"/>
+              <a:defRPr sz="1800" kern="1200">
+                <a:solidFill>
+                  <a:schemeClr val="tx1"/>
+                </a:solidFill>
+                <a:latin typeface="+mn-lt"/>
+                <a:ea typeface="+mn-ea"/>
+                <a:cs typeface="+mn-cs"/>
+              </a:defRPr>
+            </a:lvl4pPr>
+            <a:lvl5pPr marL="2057400" indent="-228600" algn="l" defTabSz="914400" rtl="0" eaLnBrk="1" latinLnBrk="0" hangingPunct="1">
+              <a:lnSpc>
+                <a:spcPct val="90000"/>
+              </a:lnSpc>
+              <a:spcBef>
+                <a:spcPts val="500"/>
+              </a:spcBef>
+              <a:buFont typeface="Arial" panose="020B0604020202020204" pitchFamily="34" charset="0"/>
+              <a:buChar char="•"/>
+              <a:defRPr sz="1800" kern="1200">
+                <a:solidFill>
+                  <a:schemeClr val="tx1"/>
+                </a:solidFill>
+                <a:latin typeface="+mn-lt"/>
+                <a:ea typeface="+mn-ea"/>
+                <a:cs typeface="+mn-cs"/>
+              </a:defRPr>
+            </a:lvl5pPr>
+            <a:lvl6pPr marL="2514600" indent="-228600" algn="l" defTabSz="914400" rtl="0" eaLnBrk="1" latinLnBrk="0" hangingPunct="1">
+              <a:lnSpc>
+                <a:spcPct val="90000"/>
+              </a:lnSpc>
+              <a:spcBef>
+                <a:spcPts val="500"/>
+              </a:spcBef>
+              <a:buFont typeface="Arial" panose="020B0604020202020204" pitchFamily="34" charset="0"/>
+              <a:buChar char="•"/>
+              <a:defRPr sz="1800" kern="1200">
+                <a:solidFill>
+                  <a:schemeClr val="tx1"/>
+                </a:solidFill>
+                <a:latin typeface="+mn-lt"/>
+                <a:ea typeface="+mn-ea"/>
+                <a:cs typeface="+mn-cs"/>
+              </a:defRPr>
+            </a:lvl6pPr>
+            <a:lvl7pPr marL="2971800" indent="-228600" algn="l" defTabSz="914400" rtl="0" eaLnBrk="1" latinLnBrk="0" hangingPunct="1">
+              <a:lnSpc>
+                <a:spcPct val="90000"/>
+              </a:lnSpc>
+              <a:spcBef>
+                <a:spcPts val="500"/>
+              </a:spcBef>
+              <a:buFont typeface="Arial" panose="020B0604020202020204" pitchFamily="34" charset="0"/>
+              <a:buChar char="•"/>
+              <a:defRPr sz="1800" kern="1200">
+                <a:solidFill>
+                  <a:schemeClr val="tx1"/>
+                </a:solidFill>
+                <a:latin typeface="+mn-lt"/>
+                <a:ea typeface="+mn-ea"/>
+                <a:cs typeface="+mn-cs"/>
+              </a:defRPr>
+            </a:lvl7pPr>
+            <a:lvl8pPr marL="3429000" indent="-228600" algn="l" defTabSz="914400" rtl="0" eaLnBrk="1" latinLnBrk="0" hangingPunct="1">
+              <a:lnSpc>
+                <a:spcPct val="90000"/>
+              </a:lnSpc>
+              <a:spcBef>
+                <a:spcPts val="500"/>
+              </a:spcBef>
+              <a:buFont typeface="Arial" panose="020B0604020202020204" pitchFamily="34" charset="0"/>
+              <a:buChar char="•"/>
+              <a:defRPr sz="1800" kern="1200">
+                <a:solidFill>
+                  <a:schemeClr val="tx1"/>
+                </a:solidFill>
+                <a:latin typeface="+mn-lt"/>
+                <a:ea typeface="+mn-ea"/>
+                <a:cs typeface="+mn-cs"/>
+              </a:defRPr>
+            </a:lvl8pPr>
+            <a:lvl9pPr marL="3886200" indent="-228600" algn="l" defTabSz="914400" rtl="0" eaLnBrk="1" latinLnBrk="0" hangingPunct="1">
+              <a:lnSpc>
+                <a:spcPct val="90000"/>
+              </a:lnSpc>
+              <a:spcBef>
+                <a:spcPts val="500"/>
+              </a:spcBef>
+              <a:buFont typeface="Arial" panose="020B0604020202020204" pitchFamily="34" charset="0"/>
+              <a:buChar char="•"/>
+              <a:defRPr sz="1800" kern="1200">
+                <a:solidFill>
+                  <a:schemeClr val="tx1"/>
+                </a:solidFill>
+                <a:latin typeface="+mn-lt"/>
+                <a:ea typeface="+mn-ea"/>
+                <a:cs typeface="+mn-cs"/>
+              </a:defRPr>
+            </a:lvl9pPr>
+          </a:lstStyle>
+          <a:p>
+            <a:endParaRPr lang="en-GB" sz="1400" dirty="0"/>
+          </a:p>
+        </p:txBody>
+      </p:sp>
+      <p:sp>
+        <p:nvSpPr>
+          <p:cNvPr id="5" name="Content Placeholder 2">
+            <a:extLst>
+              <a:ext uri="{FF2B5EF4-FFF2-40B4-BE49-F238E27FC236}">
+                <a16:creationId xmlns:a16="http://schemas.microsoft.com/office/drawing/2014/main" id="{0E5F095E-38E8-141D-B844-83A251BA7147}"/>
+              </a:ext>
+            </a:extLst>
+          </p:cNvPr>
+          <p:cNvSpPr txBox="1">
+            <a:spLocks/>
+          </p:cNvSpPr>
+          <p:nvPr/>
+        </p:nvSpPr>
+        <p:spPr>
+          <a:xfrm>
+            <a:off x="272145" y="1875388"/>
+            <a:ext cx="3068214" cy="4351338"/>
+          </a:xfrm>
+          <a:prstGeom prst="rect">
+            <a:avLst/>
+          </a:prstGeom>
+        </p:spPr>
+        <p:txBody>
+          <a:bodyPr vert="horz" lIns="91440" tIns="45720" rIns="91440" bIns="45720" rtlCol="0">
+            <a:normAutofit/>
+          </a:bodyPr>
+          <a:lstStyle>
+            <a:lvl1pPr marL="228600" indent="-228600" algn="l" defTabSz="914400" rtl="0" eaLnBrk="1" latinLnBrk="0" hangingPunct="1">
+              <a:lnSpc>
+                <a:spcPct val="90000"/>
+              </a:lnSpc>
+              <a:spcBef>
+                <a:spcPts val="1000"/>
+              </a:spcBef>
+              <a:buFont typeface="Arial" panose="020B0604020202020204" pitchFamily="34" charset="0"/>
+              <a:buChar char="•"/>
+              <a:defRPr sz="2800" kern="1200">
+                <a:solidFill>
+                  <a:schemeClr val="tx1"/>
+                </a:solidFill>
+                <a:latin typeface="+mn-lt"/>
+                <a:ea typeface="+mn-ea"/>
+                <a:cs typeface="+mn-cs"/>
+              </a:defRPr>
+            </a:lvl1pPr>
+            <a:lvl2pPr marL="685800" indent="-228600" algn="l" defTabSz="914400" rtl="0" eaLnBrk="1" latinLnBrk="0" hangingPunct="1">
+              <a:lnSpc>
+                <a:spcPct val="90000"/>
+              </a:lnSpc>
+              <a:spcBef>
+                <a:spcPts val="500"/>
+              </a:spcBef>
+              <a:buFont typeface="Arial" panose="020B0604020202020204" pitchFamily="34" charset="0"/>
+              <a:buChar char="•"/>
+              <a:defRPr sz="2400" kern="1200">
+                <a:solidFill>
+                  <a:schemeClr val="tx1"/>
+                </a:solidFill>
+                <a:latin typeface="+mn-lt"/>
+                <a:ea typeface="+mn-ea"/>
+                <a:cs typeface="+mn-cs"/>
+              </a:defRPr>
+            </a:lvl2pPr>
+            <a:lvl3pPr marL="1143000" indent="-228600" algn="l" defTabSz="914400" rtl="0" eaLnBrk="1" latinLnBrk="0" hangingPunct="1">
+              <a:lnSpc>
+                <a:spcPct val="90000"/>
+              </a:lnSpc>
+              <a:spcBef>
+                <a:spcPts val="500"/>
+              </a:spcBef>
+              <a:buFont typeface="Arial" panose="020B0604020202020204" pitchFamily="34" charset="0"/>
+              <a:buChar char="•"/>
+              <a:defRPr sz="2000" kern="1200">
+                <a:solidFill>
+                  <a:schemeClr val="tx1"/>
+                </a:solidFill>
+                <a:latin typeface="+mn-lt"/>
+                <a:ea typeface="+mn-ea"/>
+                <a:cs typeface="+mn-cs"/>
+              </a:defRPr>
+            </a:lvl3pPr>
+            <a:lvl4pPr marL="1600200" indent="-228600" algn="l" defTabSz="914400" rtl="0" eaLnBrk="1" latinLnBrk="0" hangingPunct="1">
+              <a:lnSpc>
+                <a:spcPct val="90000"/>
+              </a:lnSpc>
+              <a:spcBef>
+                <a:spcPts val="500"/>
+              </a:spcBef>
+              <a:buFont typeface="Arial" panose="020B0604020202020204" pitchFamily="34" charset="0"/>
+              <a:buChar char="•"/>
+              <a:defRPr sz="1800" kern="1200">
+                <a:solidFill>
+                  <a:schemeClr val="tx1"/>
+                </a:solidFill>
+                <a:latin typeface="+mn-lt"/>
+                <a:ea typeface="+mn-ea"/>
+                <a:cs typeface="+mn-cs"/>
+              </a:defRPr>
+            </a:lvl4pPr>
+            <a:lvl5pPr marL="2057400" indent="-228600" algn="l" defTabSz="914400" rtl="0" eaLnBrk="1" latinLnBrk="0" hangingPunct="1">
+              <a:lnSpc>
+                <a:spcPct val="90000"/>
+              </a:lnSpc>
+              <a:spcBef>
+                <a:spcPts val="500"/>
+              </a:spcBef>
+              <a:buFont typeface="Arial" panose="020B0604020202020204" pitchFamily="34" charset="0"/>
+              <a:buChar char="•"/>
+              <a:defRPr sz="1800" kern="1200">
+                <a:solidFill>
+                  <a:schemeClr val="tx1"/>
+                </a:solidFill>
+                <a:latin typeface="+mn-lt"/>
+                <a:ea typeface="+mn-ea"/>
+                <a:cs typeface="+mn-cs"/>
+              </a:defRPr>
+            </a:lvl5pPr>
+            <a:lvl6pPr marL="2514600" indent="-228600" algn="l" defTabSz="914400" rtl="0" eaLnBrk="1" latinLnBrk="0" hangingPunct="1">
+              <a:lnSpc>
+                <a:spcPct val="90000"/>
+              </a:lnSpc>
+              <a:spcBef>
+                <a:spcPts val="500"/>
+              </a:spcBef>
+              <a:buFont typeface="Arial" panose="020B0604020202020204" pitchFamily="34" charset="0"/>
+              <a:buChar char="•"/>
+              <a:defRPr sz="1800" kern="1200">
+                <a:solidFill>
+                  <a:schemeClr val="tx1"/>
+                </a:solidFill>
+                <a:latin typeface="+mn-lt"/>
+                <a:ea typeface="+mn-ea"/>
+                <a:cs typeface="+mn-cs"/>
+              </a:defRPr>
+            </a:lvl6pPr>
+            <a:lvl7pPr marL="2971800" indent="-228600" algn="l" defTabSz="914400" rtl="0" eaLnBrk="1" latinLnBrk="0" hangingPunct="1">
+              <a:lnSpc>
+                <a:spcPct val="90000"/>
+              </a:lnSpc>
+              <a:spcBef>
+                <a:spcPts val="500"/>
+              </a:spcBef>
+              <a:buFont typeface="Arial" panose="020B0604020202020204" pitchFamily="34" charset="0"/>
+              <a:buChar char="•"/>
+              <a:defRPr sz="1800" kern="1200">
+                <a:solidFill>
+                  <a:schemeClr val="tx1"/>
+                </a:solidFill>
+                <a:latin typeface="+mn-lt"/>
+                <a:ea typeface="+mn-ea"/>
+                <a:cs typeface="+mn-cs"/>
+              </a:defRPr>
+            </a:lvl7pPr>
+            <a:lvl8pPr marL="3429000" indent="-228600" algn="l" defTabSz="914400" rtl="0" eaLnBrk="1" latinLnBrk="0" hangingPunct="1">
+              <a:lnSpc>
+                <a:spcPct val="90000"/>
+              </a:lnSpc>
+              <a:spcBef>
+                <a:spcPts val="500"/>
+              </a:spcBef>
+              <a:buFont typeface="Arial" panose="020B0604020202020204" pitchFamily="34" charset="0"/>
+              <a:buChar char="•"/>
+              <a:defRPr sz="1800" kern="1200">
+                <a:solidFill>
+                  <a:schemeClr val="tx1"/>
+                </a:solidFill>
+                <a:latin typeface="+mn-lt"/>
+                <a:ea typeface="+mn-ea"/>
+                <a:cs typeface="+mn-cs"/>
+              </a:defRPr>
+            </a:lvl8pPr>
+            <a:lvl9pPr marL="3886200" indent="-228600" algn="l" defTabSz="914400" rtl="0" eaLnBrk="1" latinLnBrk="0" hangingPunct="1">
+              <a:lnSpc>
+                <a:spcPct val="90000"/>
+              </a:lnSpc>
+              <a:spcBef>
+                <a:spcPts val="500"/>
+              </a:spcBef>
+              <a:buFont typeface="Arial" panose="020B0604020202020204" pitchFamily="34" charset="0"/>
+              <a:buChar char="•"/>
+              <a:defRPr sz="1800" kern="1200">
+                <a:solidFill>
+                  <a:schemeClr val="tx1"/>
+                </a:solidFill>
+                <a:latin typeface="+mn-lt"/>
+                <a:ea typeface="+mn-ea"/>
+                <a:cs typeface="+mn-cs"/>
+              </a:defRPr>
+            </a:lvl9pPr>
+          </a:lstStyle>
+          <a:p>
+            <a:r>
+              <a:rPr lang="en-GB" sz="1400" dirty="0"/>
+              <a:t>Current cloud computing challenges</a:t>
+            </a:r>
+          </a:p>
+          <a:p>
+            <a:r>
+              <a:rPr lang="en-GB" sz="1400" dirty="0"/>
+              <a:t>State of the art</a:t>
+            </a:r>
+          </a:p>
+          <a:p>
+            <a:endParaRPr lang="en-GB" sz="1400" dirty="0"/>
+          </a:p>
+          <a:p>
+            <a:r>
+              <a:rPr lang="en-GB" sz="1400" dirty="0"/>
+              <a:t>Most adequate tool analysis</a:t>
+            </a:r>
+          </a:p>
+          <a:p>
+            <a:endParaRPr lang="en-GB" sz="1400" dirty="0"/>
+          </a:p>
+          <a:p>
+            <a:r>
+              <a:rPr lang="en-GB" sz="1400" dirty="0"/>
+              <a:t>Cloud computing modelling</a:t>
+            </a:r>
+          </a:p>
+          <a:p>
+            <a:endParaRPr lang="en-GB" sz="1400" dirty="0"/>
+          </a:p>
+          <a:p>
+            <a:endParaRPr lang="en-GB" sz="1400" dirty="0"/>
+          </a:p>
+          <a:p>
+            <a:r>
+              <a:rPr lang="en-GB" sz="1400" dirty="0"/>
+              <a:t>General M/g/m queue analysis</a:t>
+            </a:r>
+          </a:p>
+          <a:p>
+            <a:endParaRPr lang="en-GB" sz="1400" dirty="0"/>
+          </a:p>
+          <a:p>
+            <a:r>
+              <a:rPr lang="en-GB" sz="1400" dirty="0"/>
+              <a:t>Modification analysis of data queues</a:t>
+            </a:r>
+          </a:p>
+          <a:p>
+            <a:endParaRPr lang="en-GB" sz="1400" dirty="0"/>
+          </a:p>
+          <a:p>
+            <a:pPr marL="0" indent="0">
+              <a:buNone/>
+            </a:pPr>
+            <a:endParaRPr lang="en-GB" sz="1400" dirty="0"/>
+          </a:p>
+          <a:p>
+            <a:endParaRPr lang="en-GB" sz="1400" dirty="0"/>
           </a:p>
         </p:txBody>
       </p:sp>

</xml_diff>